<commit_message>
Synch up before remote desktop transfer
</commit_message>
<xml_diff>
--- a/CISC897/Assignments/Assignment7_3MT/SingleStaticSlide.pptx
+++ b/CISC897/Assignments/Assignment7_3MT/SingleStaticSlide.pptx
@@ -6,6 +6,7 @@
   </p:sldMasterIdLst>
   <p:sldIdLst>
     <p:sldId id="256" r:id="rId2"/>
+    <p:sldId id="257" r:id="rId3"/>
   </p:sldIdLst>
   <p:sldSz cx="12192000" cy="6858000"/>
   <p:notesSz cx="6858000" cy="9144000"/>
@@ -104,6 +105,11 @@
       </a:defRPr>
     </a:lvl9pPr>
   </p:defaultTextStyle>
+  <p:extLst>
+    <p:ext uri="{EFAFB233-063F-42B5-8137-9DF3F51BA10A}">
+      <p15:sldGuideLst xmlns:p15="http://schemas.microsoft.com/office/powerpoint/2012/main"/>
+    </p:ext>
+  </p:extLst>
 </p:presentation>
 </file>
 
@@ -238,7 +244,7 @@
           <a:p>
             <a:fld id="{A34CDA97-93BD-4298-908A-D16BBAF53BE9}" type="datetimeFigureOut">
               <a:rPr lang="en-CA" smtClean="0"/>
-              <a:t>29/10/2016</a:t>
+              <a:t>01/11/2016</a:t>
             </a:fld>
             <a:endParaRPr lang="en-CA"/>
           </a:p>
@@ -408,7 +414,7 @@
           <a:p>
             <a:fld id="{A34CDA97-93BD-4298-908A-D16BBAF53BE9}" type="datetimeFigureOut">
               <a:rPr lang="en-CA" smtClean="0"/>
-              <a:t>29/10/2016</a:t>
+              <a:t>01/11/2016</a:t>
             </a:fld>
             <a:endParaRPr lang="en-CA"/>
           </a:p>
@@ -588,7 +594,7 @@
           <a:p>
             <a:fld id="{A34CDA97-93BD-4298-908A-D16BBAF53BE9}" type="datetimeFigureOut">
               <a:rPr lang="en-CA" smtClean="0"/>
-              <a:t>29/10/2016</a:t>
+              <a:t>01/11/2016</a:t>
             </a:fld>
             <a:endParaRPr lang="en-CA"/>
           </a:p>
@@ -758,7 +764,7 @@
           <a:p>
             <a:fld id="{A34CDA97-93BD-4298-908A-D16BBAF53BE9}" type="datetimeFigureOut">
               <a:rPr lang="en-CA" smtClean="0"/>
-              <a:t>29/10/2016</a:t>
+              <a:t>01/11/2016</a:t>
             </a:fld>
             <a:endParaRPr lang="en-CA"/>
           </a:p>
@@ -1004,7 +1010,7 @@
           <a:p>
             <a:fld id="{A34CDA97-93BD-4298-908A-D16BBAF53BE9}" type="datetimeFigureOut">
               <a:rPr lang="en-CA" smtClean="0"/>
-              <a:t>29/10/2016</a:t>
+              <a:t>01/11/2016</a:t>
             </a:fld>
             <a:endParaRPr lang="en-CA"/>
           </a:p>
@@ -1236,7 +1242,7 @@
           <a:p>
             <a:fld id="{A34CDA97-93BD-4298-908A-D16BBAF53BE9}" type="datetimeFigureOut">
               <a:rPr lang="en-CA" smtClean="0"/>
-              <a:t>29/10/2016</a:t>
+              <a:t>01/11/2016</a:t>
             </a:fld>
             <a:endParaRPr lang="en-CA"/>
           </a:p>
@@ -1603,7 +1609,7 @@
           <a:p>
             <a:fld id="{A34CDA97-93BD-4298-908A-D16BBAF53BE9}" type="datetimeFigureOut">
               <a:rPr lang="en-CA" smtClean="0"/>
-              <a:t>29/10/2016</a:t>
+              <a:t>01/11/2016</a:t>
             </a:fld>
             <a:endParaRPr lang="en-CA"/>
           </a:p>
@@ -1721,7 +1727,7 @@
           <a:p>
             <a:fld id="{A34CDA97-93BD-4298-908A-D16BBAF53BE9}" type="datetimeFigureOut">
               <a:rPr lang="en-CA" smtClean="0"/>
-              <a:t>29/10/2016</a:t>
+              <a:t>01/11/2016</a:t>
             </a:fld>
             <a:endParaRPr lang="en-CA"/>
           </a:p>
@@ -1816,7 +1822,7 @@
           <a:p>
             <a:fld id="{A34CDA97-93BD-4298-908A-D16BBAF53BE9}" type="datetimeFigureOut">
               <a:rPr lang="en-CA" smtClean="0"/>
-              <a:t>29/10/2016</a:t>
+              <a:t>01/11/2016</a:t>
             </a:fld>
             <a:endParaRPr lang="en-CA"/>
           </a:p>
@@ -2093,7 +2099,7 @@
           <a:p>
             <a:fld id="{A34CDA97-93BD-4298-908A-D16BBAF53BE9}" type="datetimeFigureOut">
               <a:rPr lang="en-CA" smtClean="0"/>
-              <a:t>29/10/2016</a:t>
+              <a:t>01/11/2016</a:t>
             </a:fld>
             <a:endParaRPr lang="en-CA"/>
           </a:p>
@@ -2346,7 +2352,7 @@
           <a:p>
             <a:fld id="{A34CDA97-93BD-4298-908A-D16BBAF53BE9}" type="datetimeFigureOut">
               <a:rPr lang="en-CA" smtClean="0"/>
-              <a:t>29/10/2016</a:t>
+              <a:t>01/11/2016</a:t>
             </a:fld>
             <a:endParaRPr lang="en-CA"/>
           </a:p>
@@ -2559,7 +2565,7 @@
           <a:p>
             <a:fld id="{A34CDA97-93BD-4298-908A-D16BBAF53BE9}" type="datetimeFigureOut">
               <a:rPr lang="en-CA" smtClean="0"/>
-              <a:t>29/10/2016</a:t>
+              <a:t>01/11/2016</a:t>
             </a:fld>
             <a:endParaRPr lang="en-CA"/>
           </a:p>
@@ -2977,6 +2983,198 @@
 </p:sld>
 </file>
 
+<file path=ppt/slides/slide2.xml><?xml version="1.0" encoding="utf-8"?>
+<p:sld xmlns:a="http://schemas.openxmlformats.org/drawingml/2006/main" xmlns:r="http://schemas.openxmlformats.org/officeDocument/2006/relationships" xmlns:p="http://schemas.openxmlformats.org/presentationml/2006/main">
+  <p:cSld>
+    <p:spTree>
+      <p:nvGrpSpPr>
+        <p:cNvPr id="1" name=""/>
+        <p:cNvGrpSpPr/>
+        <p:nvPr/>
+      </p:nvGrpSpPr>
+      <p:grpSpPr>
+        <a:xfrm>
+          <a:off x="0" y="0"/>
+          <a:ext cx="0" cy="0"/>
+          <a:chOff x="0" y="0"/>
+          <a:chExt cx="0" cy="0"/>
+        </a:xfrm>
+      </p:grpSpPr>
+      <p:sp>
+        <p:nvSpPr>
+          <p:cNvPr id="2" name="Title 1"/>
+          <p:cNvSpPr>
+            <a:spLocks noGrp="1"/>
+          </p:cNvSpPr>
+          <p:nvPr>
+            <p:ph type="title"/>
+          </p:nvPr>
+        </p:nvSpPr>
+        <p:spPr/>
+        <p:txBody>
+          <a:bodyPr/>
+          <a:lstStyle/>
+          <a:p>
+            <a:r>
+              <a:rPr lang="en-CA" dirty="0" smtClean="0"/>
+              <a:t>Neural Networks for Scoliosis Quantification</a:t>
+            </a:r>
+            <a:endParaRPr lang="en-CA" dirty="0"/>
+          </a:p>
+        </p:txBody>
+      </p:sp>
+      <p:grpSp>
+        <p:nvGrpSpPr>
+          <p:cNvPr id="13" name="Group 12"/>
+          <p:cNvGrpSpPr/>
+          <p:nvPr/>
+        </p:nvGrpSpPr>
+        <p:grpSpPr>
+          <a:xfrm>
+            <a:off x="838200" y="1524596"/>
+            <a:ext cx="3507377" cy="4998124"/>
+            <a:chOff x="1069361" y="1510608"/>
+            <a:chExt cx="3209079" cy="4604135"/>
+          </a:xfrm>
+        </p:grpSpPr>
+        <p:sp>
+          <p:nvSpPr>
+            <p:cNvPr id="10" name="TextBox 9"/>
+            <p:cNvSpPr txBox="1"/>
+            <p:nvPr/>
+          </p:nvSpPr>
+          <p:spPr>
+            <a:xfrm>
+              <a:off x="1069361" y="5868522"/>
+              <a:ext cx="3209079" cy="246221"/>
+            </a:xfrm>
+            <a:prstGeom prst="rect">
+              <a:avLst/>
+            </a:prstGeom>
+            <a:noFill/>
+          </p:spPr>
+          <p:txBody>
+            <a:bodyPr wrap="square" rtlCol="0">
+              <a:spAutoFit/>
+            </a:bodyPr>
+            <a:lstStyle/>
+            <a:p>
+              <a:r>
+                <a:rPr lang="en-CA" sz="1000" dirty="0">
+                  <a:solidFill>
+                    <a:schemeClr val="bg1">
+                      <a:lumMod val="50000"/>
+                    </a:schemeClr>
+                  </a:solidFill>
+                </a:rPr>
+                <a:t>http://spinewave.co.nz/wp-content/uploads/scoliosis.jpeg</a:t>
+              </a:r>
+            </a:p>
+          </p:txBody>
+        </p:sp>
+        <p:pic>
+          <p:nvPicPr>
+            <p:cNvPr id="12" name="Picture 11"/>
+            <p:cNvPicPr>
+              <a:picLocks noChangeAspect="1"/>
+            </p:cNvPicPr>
+            <p:nvPr/>
+          </p:nvPicPr>
+          <p:blipFill>
+            <a:blip r:embed="rId2" cstate="print">
+              <a:extLst>
+                <a:ext uri="{28A0092B-C50C-407E-A947-70E740481C1C}">
+                  <a14:useLocalDpi xmlns:a14="http://schemas.microsoft.com/office/drawing/2010/main" val="0"/>
+                </a:ext>
+              </a:extLst>
+            </a:blip>
+            <a:stretch>
+              <a:fillRect/>
+            </a:stretch>
+          </p:blipFill>
+          <p:spPr>
+            <a:xfrm>
+              <a:off x="1121394" y="1510608"/>
+              <a:ext cx="3105014" cy="4357914"/>
+            </a:xfrm>
+            <a:prstGeom prst="rect">
+              <a:avLst/>
+            </a:prstGeom>
+          </p:spPr>
+        </p:pic>
+      </p:grpSp>
+      <p:pic>
+        <p:nvPicPr>
+          <p:cNvPr id="14" name="Picture 13"/>
+          <p:cNvPicPr>
+            <a:picLocks noChangeAspect="1"/>
+          </p:cNvPicPr>
+          <p:nvPr/>
+        </p:nvPicPr>
+        <p:blipFill rotWithShape="1">
+          <a:blip r:embed="rId3">
+            <a:extLst>
+              <a:ext uri="{28A0092B-C50C-407E-A947-70E740481C1C}">
+                <a14:useLocalDpi xmlns:a14="http://schemas.microsoft.com/office/drawing/2010/main" val="0"/>
+              </a:ext>
+            </a:extLst>
+          </a:blip>
+          <a:srcRect b="2091"/>
+          <a:stretch/>
+        </p:blipFill>
+        <p:spPr>
+          <a:xfrm>
+            <a:off x="8604001" y="1524596"/>
+            <a:ext cx="2806669" cy="4754284"/>
+          </a:xfrm>
+          <a:prstGeom prst="rect">
+            <a:avLst/>
+          </a:prstGeom>
+        </p:spPr>
+      </p:pic>
+      <p:pic>
+        <p:nvPicPr>
+          <p:cNvPr id="15" name="Picture 14"/>
+          <p:cNvPicPr>
+            <a:picLocks noChangeAspect="1"/>
+          </p:cNvPicPr>
+          <p:nvPr/>
+        </p:nvPicPr>
+        <p:blipFill>
+          <a:blip r:embed="rId4">
+            <a:extLst>
+              <a:ext uri="{28A0092B-C50C-407E-A947-70E740481C1C}">
+                <a14:useLocalDpi xmlns:a14="http://schemas.microsoft.com/office/drawing/2010/main" val="0"/>
+              </a:ext>
+            </a:extLst>
+          </a:blip>
+          <a:stretch>
+            <a:fillRect/>
+          </a:stretch>
+        </p:blipFill>
+        <p:spPr>
+          <a:xfrm>
+            <a:off x="4790406" y="1524596"/>
+            <a:ext cx="3151812" cy="4765626"/>
+          </a:xfrm>
+          <a:prstGeom prst="rect">
+            <a:avLst/>
+          </a:prstGeom>
+        </p:spPr>
+      </p:pic>
+    </p:spTree>
+    <p:extLst>
+      <p:ext uri="{BB962C8B-B14F-4D97-AF65-F5344CB8AC3E}">
+        <p14:creationId xmlns:p14="http://schemas.microsoft.com/office/powerpoint/2010/main" val="486664430"/>
+      </p:ext>
+    </p:extLst>
+  </p:cSld>
+  <p:clrMapOvr>
+    <a:masterClrMapping/>
+  </p:clrMapOvr>
+</p:sld>
+</file>
+
 <file path=ppt/theme/theme1.xml><?xml version="1.0" encoding="utf-8"?>
 <a:theme xmlns:a="http://schemas.openxmlformats.org/drawingml/2006/main" name="Office Theme">
   <a:themeElements>

</xml_diff>